<commit_message>
Modify market gap formating
</commit_message>
<xml_diff>
--- a/Presentations/DesignPres/Jeff's Material/MarketGap.pptx
+++ b/Presentations/DesignPres/Jeff's Material/MarketGap.pptx
@@ -600,17 +600,31 @@
         </c:dLbls>
         <c:bubbleScale val="100"/>
         <c:showNegBubbles val="0"/>
-        <c:axId val="371580320"/>
-        <c:axId val="371580712"/>
+        <c:axId val="213979840"/>
+        <c:axId val="213965152"/>
       </c:bubbleChart>
       <c:valAx>
-        <c:axId val="371580320"/>
+        <c:axId val="213979840"/>
         <c:scaling>
           <c:orientation val="minMax"/>
           <c:min val="0"/>
         </c:scaling>
         <c:delete val="0"/>
         <c:axPos val="b"/>
+        <c:majorGridlines>
+          <c:spPr>
+            <a:ln w="9525" cap="flat" cmpd="sng" algn="ctr">
+              <a:solidFill>
+                <a:schemeClr val="tx1">
+                  <a:lumMod val="15000"/>
+                  <a:lumOff val="85000"/>
+                </a:schemeClr>
+              </a:solidFill>
+              <a:round/>
+            </a:ln>
+            <a:effectLst/>
+          </c:spPr>
+        </c:majorGridlines>
         <c:title>
           <c:tx>
             <c:rich>
@@ -681,14 +695,12 @@
         <c:tickLblPos val="nextTo"/>
         <c:spPr>
           <a:noFill/>
-          <a:ln w="9525" cap="flat" cmpd="sng" algn="ctr">
+          <a:ln>
             <a:solidFill>
-              <a:schemeClr val="tx1">
-                <a:lumMod val="15000"/>
-                <a:lumOff val="85000"/>
+              <a:schemeClr val="bg1">
+                <a:lumMod val="65000"/>
               </a:schemeClr>
             </a:solidFill>
-            <a:round/>
           </a:ln>
           <a:effectLst/>
         </c:spPr>
@@ -712,12 +724,12 @@
             <a:endParaRPr lang="en-US"/>
           </a:p>
         </c:txPr>
-        <c:crossAx val="371580712"/>
+        <c:crossAx val="213965152"/>
         <c:crosses val="autoZero"/>
         <c:crossBetween val="midCat"/>
       </c:valAx>
       <c:valAx>
-        <c:axId val="371580712"/>
+        <c:axId val="213965152"/>
         <c:scaling>
           <c:orientation val="minMax"/>
           <c:max val="3500"/>
@@ -725,6 +737,20 @@
         </c:scaling>
         <c:delete val="0"/>
         <c:axPos val="l"/>
+        <c:majorGridlines>
+          <c:spPr>
+            <a:ln w="9525" cap="flat" cmpd="sng" algn="ctr">
+              <a:solidFill>
+                <a:schemeClr val="tx1">
+                  <a:lumMod val="15000"/>
+                  <a:lumOff val="85000"/>
+                </a:schemeClr>
+              </a:solidFill>
+              <a:round/>
+            </a:ln>
+            <a:effectLst/>
+          </c:spPr>
+        </c:majorGridlines>
         <c:title>
           <c:tx>
             <c:rich>
@@ -793,7 +819,11 @@
         <c:spPr>
           <a:noFill/>
           <a:ln>
-            <a:noFill/>
+            <a:solidFill>
+              <a:schemeClr val="bg1">
+                <a:lumMod val="65000"/>
+              </a:schemeClr>
+            </a:solidFill>
           </a:ln>
           <a:effectLst/>
         </c:spPr>
@@ -817,7 +847,7 @@
             <a:endParaRPr lang="en-US"/>
           </a:p>
         </c:txPr>
-        <c:crossAx val="371580320"/>
+        <c:crossAx val="213979840"/>
         <c:crosses val="autoZero"/>
         <c:crossBetween val="midCat"/>
       </c:valAx>
@@ -835,8 +865,8 @@
         <c:manualLayout>
           <c:xMode val="edge"/>
           <c:yMode val="edge"/>
-          <c:x val="0.76503553525637435"/>
-          <c:y val="7.5587729569926876E-2"/>
+          <c:x val="0.80156184031668198"/>
+          <c:y val="0.10487643491113739"/>
           <c:w val="0.19843815968331802"/>
           <c:h val="0.15200665107292949"/>
         </c:manualLayout>
@@ -1445,12 +1475,12 @@
 <c:userShapes xmlns:c="http://schemas.openxmlformats.org/drawingml/2006/chart">
   <cdr:relSizeAnchor xmlns:cdr="http://schemas.openxmlformats.org/drawingml/2006/chartDrawing">
     <cdr:from>
-      <cdr:x>0.75321</cdr:x>
-      <cdr:y>0.58713</cdr:y>
+      <cdr:x>0.74789</cdr:x>
+      <cdr:y>0.62498</cdr:y>
     </cdr:from>
     <cdr:to>
-      <cdr:x>0.9685</cdr:x>
-      <cdr:y>0.80178</cdr:y>
+      <cdr:x>0.96318</cdr:x>
+      <cdr:y>0.83963</cdr:y>
     </cdr:to>
     <cdr:sp macro="" textlink="">
       <cdr:nvSpPr>
@@ -1459,8 +1489,8 @@
       </cdr:nvSpPr>
       <cdr:spPr>
         <a:xfrm xmlns:a="http://schemas.openxmlformats.org/drawingml/2006/main">
-          <a:off x="5978270" y="3055038"/>
-          <a:ext cx="1708767" cy="1116912"/>
+          <a:off x="5936060" y="3252002"/>
+          <a:ext cx="1708767" cy="1116904"/>
         </a:xfrm>
         <a:prstGeom xmlns:a="http://schemas.openxmlformats.org/drawingml/2006/main" prst="rect">
           <a:avLst/>
@@ -1567,7 +1597,7 @@
           <a:p>
             <a:fld id="{EDEAC965-93D5-4BF2-BEB3-753A18A2DA84}" type="datetimeFigureOut">
               <a:rPr lang="en-US" smtClean="0"/>
-              <a:t>2014-11-16</a:t>
+              <a:t>11/16/2014</a:t>
             </a:fld>
             <a:endParaRPr lang="en-US"/>
           </a:p>
@@ -2337,7 +2367,7 @@
           <a:p>
             <a:fld id="{20B296D5-E3CF-4672-8939-A7C2F0F5EC5D}" type="datetime1">
               <a:rPr lang="en-US" smtClean="0"/>
-              <a:t>2014-11-16</a:t>
+              <a:t>11/16/2014</a:t>
             </a:fld>
             <a:endParaRPr lang="en-US"/>
           </a:p>
@@ -2633,7 +2663,7 @@
           <a:p>
             <a:fld id="{28A02E2E-7E1A-4CF8-B33B-7A3A0C846DC2}" type="datetime1">
               <a:rPr lang="en-US" smtClean="0"/>
-              <a:t>2014-11-16</a:t>
+              <a:t>11/16/2014</a:t>
             </a:fld>
             <a:endParaRPr lang="en-US"/>
           </a:p>
@@ -2881,7 +2911,7 @@
           <a:p>
             <a:fld id="{8CE046AC-902E-42C0-88FC-A13213B32EAE}" type="datetime1">
               <a:rPr lang="en-US" smtClean="0"/>
-              <a:t>2014-11-16</a:t>
+              <a:t>11/16/2014</a:t>
             </a:fld>
             <a:endParaRPr lang="en-US"/>
           </a:p>
@@ -3421,7 +3451,7 @@
           <a:p>
             <a:fld id="{31A6F805-971A-403C-A032-DEFF7CF3C983}" type="datetime1">
               <a:rPr lang="en-US" smtClean="0"/>
-              <a:t>2014-11-16</a:t>
+              <a:t>11/16/2014</a:t>
             </a:fld>
             <a:endParaRPr lang="en-US"/>
           </a:p>
@@ -3669,7 +3699,7 @@
           <a:p>
             <a:fld id="{A47BC926-D3EC-4D9D-A99F-9E843187F3B0}" type="datetime1">
               <a:rPr lang="en-US" smtClean="0"/>
-              <a:t>2014-11-16</a:t>
+              <a:t>11/16/2014</a:t>
             </a:fld>
             <a:endParaRPr lang="en-US"/>
           </a:p>
@@ -4201,7 +4231,7 @@
           <a:p>
             <a:fld id="{706D8B8A-C6A1-4E34-A79C-7660F8ED0256}" type="datetime1">
               <a:rPr lang="en-US" smtClean="0"/>
-              <a:t>2014-11-16</a:t>
+              <a:t>11/16/2014</a:t>
             </a:fld>
             <a:endParaRPr lang="en-US"/>
           </a:p>
@@ -4498,7 +4528,7 @@
           <a:p>
             <a:fld id="{F4BE39B4-CFBF-45CF-82E8-4594DA2BC016}" type="datetime1">
               <a:rPr lang="en-US" smtClean="0"/>
-              <a:t>2014-11-16</a:t>
+              <a:t>11/16/2014</a:t>
             </a:fld>
             <a:endParaRPr lang="en-US"/>
           </a:p>
@@ -4672,7 +4702,7 @@
           <a:p>
             <a:fld id="{DE0C5273-F1EA-4469-BB96-269557B0EFD7}" type="datetime1">
               <a:rPr lang="en-US" smtClean="0"/>
-              <a:t>2014-11-16</a:t>
+              <a:t>11/16/2014</a:t>
             </a:fld>
             <a:endParaRPr lang="en-US"/>
           </a:p>
@@ -4852,7 +4882,7 @@
           <a:p>
             <a:fld id="{A151EF98-F8EA-4C17-B600-10F3495D73A0}" type="datetime1">
               <a:rPr lang="en-US" smtClean="0"/>
-              <a:t>2014-11-16</a:t>
+              <a:t>11/16/2014</a:t>
             </a:fld>
             <a:endParaRPr lang="en-US"/>
           </a:p>
@@ -5048,7 +5078,7 @@
           <a:p>
             <a:fld id="{573D28D5-0840-4988-BF4D-6D4AA1076FF1}" type="datetime1">
               <a:rPr lang="en-US" smtClean="0"/>
-              <a:t>2014-11-16</a:t>
+              <a:t>11/16/2014</a:t>
             </a:fld>
             <a:endParaRPr lang="en-US"/>
           </a:p>
@@ -5301,7 +5331,7 @@
           <a:p>
             <a:fld id="{9F96B093-F3D2-4BE9-838E-E3D4B84B74A6}" type="datetime1">
               <a:rPr lang="en-US" smtClean="0"/>
-              <a:t>2014-11-16</a:t>
+              <a:t>11/16/2014</a:t>
             </a:fld>
             <a:endParaRPr lang="en-US"/>
           </a:p>
@@ -5604,7 +5634,7 @@
           <a:p>
             <a:fld id="{BE18AAB6-E895-4CF5-8797-8DBFC83C491D}" type="datetime1">
               <a:rPr lang="en-US" smtClean="0"/>
-              <a:t>2014-11-16</a:t>
+              <a:t>11/16/2014</a:t>
             </a:fld>
             <a:endParaRPr lang="en-US"/>
           </a:p>
@@ -6046,7 +6076,7 @@
           <a:p>
             <a:fld id="{72210C82-80B6-439C-A993-8C06E994D74A}" type="datetime1">
               <a:rPr lang="en-US" smtClean="0"/>
-              <a:t>2014-11-16</a:t>
+              <a:t>11/16/2014</a:t>
             </a:fld>
             <a:endParaRPr lang="en-US"/>
           </a:p>
@@ -6164,7 +6194,7 @@
           <a:p>
             <a:fld id="{24A3ABEB-97E0-4DED-AEF3-FAB70F021CC7}" type="datetime1">
               <a:rPr lang="en-US" smtClean="0"/>
-              <a:t>2014-11-16</a:t>
+              <a:t>11/16/2014</a:t>
             </a:fld>
             <a:endParaRPr lang="en-US"/>
           </a:p>
@@ -6259,7 +6289,7 @@
           <a:p>
             <a:fld id="{FFC76860-5976-4A44-8E7A-96795D52A085}" type="datetime1">
               <a:rPr lang="en-US" smtClean="0"/>
-              <a:t>2014-11-16</a:t>
+              <a:t>11/16/2014</a:t>
             </a:fld>
             <a:endParaRPr lang="en-US"/>
           </a:p>
@@ -6542,7 +6572,7 @@
           <a:p>
             <a:fld id="{D041843B-E1B4-43C8-9F5C-31408ABDC424}" type="datetime1">
               <a:rPr lang="en-US" smtClean="0"/>
-              <a:t>2014-11-16</a:t>
+              <a:t>11/16/2014</a:t>
             </a:fld>
             <a:endParaRPr lang="en-US"/>
           </a:p>
@@ -6833,7 +6863,7 @@
           <a:p>
             <a:fld id="{731A8D32-FC45-449B-9B90-E5553677A65C}" type="datetime1">
               <a:rPr lang="en-US" smtClean="0"/>
-              <a:t>2014-11-16</a:t>
+              <a:t>11/16/2014</a:t>
             </a:fld>
             <a:endParaRPr lang="en-US"/>
           </a:p>
@@ -7363,7 +7393,7 @@
           <a:p>
             <a:fld id="{5E17704D-19AD-47EC-889C-2F8A90D9F71A}" type="datetime1">
               <a:rPr lang="en-US" smtClean="0"/>
-              <a:t>2014-11-16</a:t>
+              <a:t>11/16/2014</a:t>
             </a:fld>
             <a:endParaRPr lang="en-US"/>
           </a:p>
@@ -7985,7 +8015,7 @@
           <p:nvPr>
             <p:extLst>
               <p:ext uri="{D42A27DB-BD31-4B8C-83A1-F6EECF244321}">
-                <p14:modId xmlns:p14="http://schemas.microsoft.com/office/powerpoint/2010/main" val="4266762145"/>
+                <p14:modId xmlns:p14="http://schemas.microsoft.com/office/powerpoint/2010/main" val="3789690029"/>
               </p:ext>
             </p:extLst>
           </p:nvPr>
@@ -8547,6 +8577,12 @@
 </file>
 
 <file path=customXml/item2.xml><?xml version="1.0" encoding="utf-8"?>
+<p:properties xmlns:p="http://schemas.microsoft.com/office/2006/metadata/properties" xmlns:xsi="http://www.w3.org/2001/XMLSchema-instance" xmlns:pc="http://schemas.microsoft.com/office/infopath/2007/PartnerControls">
+  <documentManagement/>
+</p:properties>
+</file>
+
+<file path=customXml/item3.xml><?xml version="1.0" encoding="utf-8"?>
 <ct:contentTypeSchema xmlns:ct="http://schemas.microsoft.com/office/2006/metadata/contentType" xmlns:ma="http://schemas.microsoft.com/office/2006/metadata/properties/metaAttributes" ct:_="" ma:_="" ma:contentTypeName="Document" ma:contentTypeID="0x01010037F85F4321109849828001F89B63E148" ma:contentTypeVersion="1" ma:contentTypeDescription="Create a new document." ma:contentTypeScope="" ma:versionID="095e360c2d3b38e9f1c3d2409eae6492">
   <xsd:schema xmlns:xsd="http://www.w3.org/2001/XMLSchema" xmlns:xs="http://www.w3.org/2001/XMLSchema" xmlns:p="http://schemas.microsoft.com/office/2006/metadata/properties" xmlns:ns3="4c2e6f55-8abc-4b5b-a4f7-930d3885115f" targetNamespace="http://schemas.microsoft.com/office/2006/metadata/properties" ma:root="true" ma:fieldsID="ce6d8a4f71ede4388f67b476f14a0021" ns3:_="">
     <xsd:import namespace="4c2e6f55-8abc-4b5b-a4f7-930d3885115f"/>
@@ -8686,12 +8722,6 @@
 </ct:contentTypeSchema>
 </file>
 
-<file path=customXml/item3.xml><?xml version="1.0" encoding="utf-8"?>
-<p:properties xmlns:p="http://schemas.microsoft.com/office/2006/metadata/properties" xmlns:xsi="http://www.w3.org/2001/XMLSchema-instance" xmlns:pc="http://schemas.microsoft.com/office/infopath/2007/PartnerControls">
-  <documentManagement/>
-</p:properties>
-</file>
-
 <file path=customXml/itemProps1.xml><?xml version="1.0" encoding="utf-8"?>
 <ds:datastoreItem xmlns:ds="http://schemas.openxmlformats.org/officeDocument/2006/customXml" ds:itemID="{A1EF12E8-B070-4F5F-9BD0-CEE0E7C075D0}">
   <ds:schemaRefs>
@@ -8701,6 +8731,22 @@
 </file>
 
 <file path=customXml/itemProps2.xml><?xml version="1.0" encoding="utf-8"?>
+<ds:datastoreItem xmlns:ds="http://schemas.openxmlformats.org/officeDocument/2006/customXml" ds:itemID="{7D5E529B-E2B8-4FF4-96DC-717B6A9731D6}">
+  <ds:schemaRefs>
+    <ds:schemaRef ds:uri="http://purl.org/dc/elements/1.1/"/>
+    <ds:schemaRef ds:uri="http://schemas.microsoft.com/office/2006/documentManagement/types"/>
+    <ds:schemaRef ds:uri="http://schemas.microsoft.com/office/2006/metadata/properties"/>
+    <ds:schemaRef ds:uri="http://www.w3.org/XML/1998/namespace"/>
+    <ds:schemaRef ds:uri="http://schemas.openxmlformats.org/package/2006/metadata/core-properties"/>
+    <ds:schemaRef ds:uri="4c2e6f55-8abc-4b5b-a4f7-930d3885115f"/>
+    <ds:schemaRef ds:uri="http://purl.org/dc/terms/"/>
+    <ds:schemaRef ds:uri="http://schemas.microsoft.com/office/infopath/2007/PartnerControls"/>
+    <ds:schemaRef ds:uri="http://purl.org/dc/dcmitype/"/>
+  </ds:schemaRefs>
+</ds:datastoreItem>
+</file>
+
+<file path=customXml/itemProps3.xml><?xml version="1.0" encoding="utf-8"?>
 <ds:datastoreItem xmlns:ds="http://schemas.openxmlformats.org/officeDocument/2006/customXml" ds:itemID="{41A76F2A-8591-44A6-B165-1D0702FBBD53}">
   <ds:schemaRefs>
     <ds:schemaRef ds:uri="http://schemas.microsoft.com/office/2006/metadata/contentType"/>
@@ -8716,20 +8762,4 @@
     <ds:schemaRef ds:uri="http://schemas.microsoft.com/internal/obd"/>
   </ds:schemaRefs>
 </ds:datastoreItem>
-</file>
-
-<file path=customXml/itemProps3.xml><?xml version="1.0" encoding="utf-8"?>
-<ds:datastoreItem xmlns:ds="http://schemas.openxmlformats.org/officeDocument/2006/customXml" ds:itemID="{7D5E529B-E2B8-4FF4-96DC-717B6A9731D6}">
-  <ds:schemaRefs>
-    <ds:schemaRef ds:uri="http://purl.org/dc/elements/1.1/"/>
-    <ds:schemaRef ds:uri="http://schemas.microsoft.com/office/2006/documentManagement/types"/>
-    <ds:schemaRef ds:uri="http://schemas.microsoft.com/office/2006/metadata/properties"/>
-    <ds:schemaRef ds:uri="http://www.w3.org/XML/1998/namespace"/>
-    <ds:schemaRef ds:uri="http://schemas.openxmlformats.org/package/2006/metadata/core-properties"/>
-    <ds:schemaRef ds:uri="4c2e6f55-8abc-4b5b-a4f7-930d3885115f"/>
-    <ds:schemaRef ds:uri="http://purl.org/dc/terms/"/>
-    <ds:schemaRef ds:uri="http://schemas.microsoft.com/office/infopath/2007/PartnerControls"/>
-    <ds:schemaRef ds:uri="http://purl.org/dc/dcmitype/"/>
-  </ds:schemaRefs>
-</ds:datastoreItem>
 </file>
</xml_diff>